<commit_message>
Power modificat ej 1
</commit_message>
<xml_diff>
--- a/LabBook_10.pptx
+++ b/LabBook_10.pptx
@@ -5092,7 +5092,7 @@
         <p:spPr>
           <a:xfrm>
             <a:off x="609441" y="4860334"/>
-            <a:ext cx="11199971" cy="1384995"/>
+            <a:ext cx="11199971" cy="1569660"/>
           </a:xfrm>
           <a:prstGeom prst="rect">
             <a:avLst/>
@@ -5125,13 +5125,485 @@
           </a:p>
           <a:p>
             <a:pPr algn="just"/>
-            <a:endParaRPr lang="en-US" sz="1200" dirty="0">
-              <a:latin typeface="Arial" panose="020B0604020202020204" pitchFamily="34" charset="0"/>
-              <a:cs typeface="Arial" panose="020B0604020202020204" pitchFamily="34" charset="0"/>
-            </a:endParaRPr>
+            <a:r>
+              <a:rPr lang="en-US" sz="1200" dirty="0">
+                <a:latin typeface="Arial" panose="020B0604020202020204" pitchFamily="34" charset="0"/>
+                <a:cs typeface="Arial" panose="020B0604020202020204" pitchFamily="34" charset="0"/>
+              </a:rPr>
+              <a:t>Se </a:t>
+            </a:r>
+            <a:r>
+              <a:rPr lang="en-US" sz="1200" dirty="0" err="1">
+                <a:latin typeface="Arial" panose="020B0604020202020204" pitchFamily="34" charset="0"/>
+                <a:cs typeface="Arial" panose="020B0604020202020204" pitchFamily="34" charset="0"/>
+              </a:rPr>
+              <a:t>observa</a:t>
+            </a:r>
+            <a:r>
+              <a:rPr lang="en-US" sz="1200" dirty="0">
+                <a:latin typeface="Arial" panose="020B0604020202020204" pitchFamily="34" charset="0"/>
+                <a:cs typeface="Arial" panose="020B0604020202020204" pitchFamily="34" charset="0"/>
+              </a:rPr>
+              <a:t> </a:t>
+            </a:r>
+            <a:r>
+              <a:rPr lang="en-US" sz="1200" dirty="0" err="1">
+                <a:latin typeface="Arial" panose="020B0604020202020204" pitchFamily="34" charset="0"/>
+                <a:cs typeface="Arial" panose="020B0604020202020204" pitchFamily="34" charset="0"/>
+              </a:rPr>
+              <a:t>qie</a:t>
+            </a:r>
+            <a:r>
+              <a:rPr lang="en-US" sz="1200" dirty="0">
+                <a:latin typeface="Arial" panose="020B0604020202020204" pitchFamily="34" charset="0"/>
+                <a:cs typeface="Arial" panose="020B0604020202020204" pitchFamily="34" charset="0"/>
+              </a:rPr>
+              <a:t> </a:t>
+            </a:r>
+            <a:r>
+              <a:rPr lang="en-US" sz="1200" dirty="0" err="1">
+                <a:latin typeface="Arial" panose="020B0604020202020204" pitchFamily="34" charset="0"/>
+                <a:cs typeface="Arial" panose="020B0604020202020204" pitchFamily="34" charset="0"/>
+              </a:rPr>
+              <a:t>el</a:t>
+            </a:r>
+            <a:r>
+              <a:rPr lang="en-US" sz="1200" dirty="0">
+                <a:latin typeface="Arial" panose="020B0604020202020204" pitchFamily="34" charset="0"/>
+                <a:cs typeface="Arial" panose="020B0604020202020204" pitchFamily="34" charset="0"/>
+              </a:rPr>
+              <a:t> </a:t>
+            </a:r>
+            <a:r>
+              <a:rPr lang="en-US" sz="1200" dirty="0" err="1">
+                <a:latin typeface="Arial" panose="020B0604020202020204" pitchFamily="34" charset="0"/>
+                <a:cs typeface="Arial" panose="020B0604020202020204" pitchFamily="34" charset="0"/>
+              </a:rPr>
+              <a:t>indice</a:t>
+            </a:r>
+            <a:r>
+              <a:rPr lang="en-US" sz="1200" dirty="0">
+                <a:latin typeface="Arial" panose="020B0604020202020204" pitchFamily="34" charset="0"/>
+                <a:cs typeface="Arial" panose="020B0604020202020204" pitchFamily="34" charset="0"/>
+              </a:rPr>
+              <a:t> </a:t>
+            </a:r>
+            <a:r>
+              <a:rPr lang="en-US" sz="1200" dirty="0" err="1">
+                <a:latin typeface="Arial" panose="020B0604020202020204" pitchFamily="34" charset="0"/>
+                <a:cs typeface="Arial" panose="020B0604020202020204" pitchFamily="34" charset="0"/>
+              </a:rPr>
+              <a:t>efectivo</a:t>
+            </a:r>
+            <a:r>
+              <a:rPr lang="en-US" sz="1200" dirty="0">
+                <a:latin typeface="Arial" panose="020B0604020202020204" pitchFamily="34" charset="0"/>
+                <a:cs typeface="Arial" panose="020B0604020202020204" pitchFamily="34" charset="0"/>
+              </a:rPr>
+              <a:t> </a:t>
+            </a:r>
+            <a:r>
+              <a:rPr lang="en-US" sz="1200" dirty="0" err="1">
+                <a:latin typeface="Arial" panose="020B0604020202020204" pitchFamily="34" charset="0"/>
+                <a:cs typeface="Arial" panose="020B0604020202020204" pitchFamily="34" charset="0"/>
+              </a:rPr>
+              <a:t>constante</a:t>
+            </a:r>
+            <a:r>
+              <a:rPr lang="en-US" sz="1200" dirty="0">
+                <a:latin typeface="Arial" panose="020B0604020202020204" pitchFamily="34" charset="0"/>
+                <a:cs typeface="Arial" panose="020B0604020202020204" pitchFamily="34" charset="0"/>
+              </a:rPr>
+              <a:t> es a </a:t>
+            </a:r>
+            <a:r>
+              <a:rPr lang="en-US" sz="1200" dirty="0" err="1">
+                <a:latin typeface="Arial" panose="020B0604020202020204" pitchFamily="34" charset="0"/>
+                <a:cs typeface="Arial" panose="020B0604020202020204" pitchFamily="34" charset="0"/>
+              </a:rPr>
+              <a:t>partir</a:t>
+            </a:r>
+            <a:r>
+              <a:rPr lang="en-US" sz="1200" dirty="0">
+                <a:latin typeface="Arial" panose="020B0604020202020204" pitchFamily="34" charset="0"/>
+                <a:cs typeface="Arial" panose="020B0604020202020204" pitchFamily="34" charset="0"/>
+              </a:rPr>
+              <a:t> de un grid de 50 puntos </a:t>
+            </a:r>
+            <a:r>
+              <a:rPr lang="en-US" sz="1200" dirty="0" err="1">
+                <a:latin typeface="Arial" panose="020B0604020202020204" pitchFamily="34" charset="0"/>
+                <a:cs typeface="Arial" panose="020B0604020202020204" pitchFamily="34" charset="0"/>
+              </a:rPr>
+              <a:t>por</a:t>
+            </a:r>
+            <a:r>
+              <a:rPr lang="en-US" sz="1200" dirty="0">
+                <a:latin typeface="Arial" panose="020B0604020202020204" pitchFamily="34" charset="0"/>
+                <a:cs typeface="Arial" panose="020B0604020202020204" pitchFamily="34" charset="0"/>
+              </a:rPr>
+              <a:t> micra, y se </a:t>
+            </a:r>
+            <a:r>
+              <a:rPr lang="en-US" sz="1200" dirty="0" err="1">
+                <a:latin typeface="Arial" panose="020B0604020202020204" pitchFamily="34" charset="0"/>
+                <a:cs typeface="Arial" panose="020B0604020202020204" pitchFamily="34" charset="0"/>
+              </a:rPr>
+              <a:t>estabiliza</a:t>
+            </a:r>
+            <a:r>
+              <a:rPr lang="en-US" sz="1200" dirty="0">
+                <a:latin typeface="Arial" panose="020B0604020202020204" pitchFamily="34" charset="0"/>
+                <a:cs typeface="Arial" panose="020B0604020202020204" pitchFamily="34" charset="0"/>
+              </a:rPr>
+              <a:t> </a:t>
+            </a:r>
+            <a:r>
+              <a:rPr lang="en-US" sz="1200" dirty="0" err="1">
+                <a:latin typeface="Arial" panose="020B0604020202020204" pitchFamily="34" charset="0"/>
+                <a:cs typeface="Arial" panose="020B0604020202020204" pitchFamily="34" charset="0"/>
+              </a:rPr>
+              <a:t>en</a:t>
+            </a:r>
+            <a:r>
+              <a:rPr lang="en-US" sz="1200" dirty="0">
+                <a:latin typeface="Arial" panose="020B0604020202020204" pitchFamily="34" charset="0"/>
+                <a:cs typeface="Arial" panose="020B0604020202020204" pitchFamily="34" charset="0"/>
+              </a:rPr>
+              <a:t> un valor de 1.605 </a:t>
+            </a:r>
+            <a:r>
+              <a:rPr lang="en-US" sz="1200" dirty="0" err="1">
+                <a:latin typeface="Arial" panose="020B0604020202020204" pitchFamily="34" charset="0"/>
+                <a:cs typeface="Arial" panose="020B0604020202020204" pitchFamily="34" charset="0"/>
+              </a:rPr>
+              <a:t>aproximadamente</a:t>
+            </a:r>
+            <a:r>
+              <a:rPr lang="en-US" sz="1200" dirty="0">
+                <a:latin typeface="Arial" panose="020B0604020202020204" pitchFamily="34" charset="0"/>
+                <a:cs typeface="Arial" panose="020B0604020202020204" pitchFamily="34" charset="0"/>
+              </a:rPr>
+              <a:t>.</a:t>
+            </a:r>
           </a:p>
           <a:p>
             <a:pPr algn="just"/>
+            <a:r>
+              <a:rPr lang="en-US" sz="1200" dirty="0">
+                <a:latin typeface="Arial" panose="020B0604020202020204" pitchFamily="34" charset="0"/>
+                <a:cs typeface="Arial" panose="020B0604020202020204" pitchFamily="34" charset="0"/>
+              </a:rPr>
+              <a:t>Por </a:t>
+            </a:r>
+            <a:r>
+              <a:rPr lang="en-US" sz="1200" dirty="0" err="1">
+                <a:latin typeface="Arial" panose="020B0604020202020204" pitchFamily="34" charset="0"/>
+                <a:cs typeface="Arial" panose="020B0604020202020204" pitchFamily="34" charset="0"/>
+              </a:rPr>
+              <a:t>otro</a:t>
+            </a:r>
+            <a:r>
+              <a:rPr lang="en-US" sz="1200" dirty="0">
+                <a:latin typeface="Arial" panose="020B0604020202020204" pitchFamily="34" charset="0"/>
+                <a:cs typeface="Arial" panose="020B0604020202020204" pitchFamily="34" charset="0"/>
+              </a:rPr>
+              <a:t> </a:t>
+            </a:r>
+            <a:r>
+              <a:rPr lang="en-US" sz="1200" dirty="0" err="1">
+                <a:latin typeface="Arial" panose="020B0604020202020204" pitchFamily="34" charset="0"/>
+                <a:cs typeface="Arial" panose="020B0604020202020204" pitchFamily="34" charset="0"/>
+              </a:rPr>
+              <a:t>lado</a:t>
+            </a:r>
+            <a:r>
+              <a:rPr lang="en-US" sz="1200" dirty="0">
+                <a:latin typeface="Arial" panose="020B0604020202020204" pitchFamily="34" charset="0"/>
+                <a:cs typeface="Arial" panose="020B0604020202020204" pitchFamily="34" charset="0"/>
+              </a:rPr>
+              <a:t>, </a:t>
+            </a:r>
+            <a:r>
+              <a:rPr lang="en-US" sz="1200" dirty="0" err="1">
+                <a:latin typeface="Arial" panose="020B0604020202020204" pitchFamily="34" charset="0"/>
+                <a:cs typeface="Arial" panose="020B0604020202020204" pitchFamily="34" charset="0"/>
+              </a:rPr>
+              <a:t>como</a:t>
+            </a:r>
+            <a:r>
+              <a:rPr lang="en-US" sz="1200" dirty="0">
+                <a:latin typeface="Arial" panose="020B0604020202020204" pitchFamily="34" charset="0"/>
+                <a:cs typeface="Arial" panose="020B0604020202020204" pitchFamily="34" charset="0"/>
+              </a:rPr>
+              <a:t> </a:t>
+            </a:r>
+            <a:r>
+              <a:rPr lang="en-US" sz="1200" dirty="0" err="1">
+                <a:latin typeface="Arial" panose="020B0604020202020204" pitchFamily="34" charset="0"/>
+                <a:cs typeface="Arial" panose="020B0604020202020204" pitchFamily="34" charset="0"/>
+              </a:rPr>
+              <a:t>este</a:t>
+            </a:r>
+            <a:r>
+              <a:rPr lang="en-US" sz="1200" dirty="0">
+                <a:latin typeface="Arial" panose="020B0604020202020204" pitchFamily="34" charset="0"/>
+                <a:cs typeface="Arial" panose="020B0604020202020204" pitchFamily="34" charset="0"/>
+              </a:rPr>
+              <a:t> valor de </a:t>
+            </a:r>
+            <a:r>
+              <a:rPr lang="en-US" sz="1200" dirty="0" err="1">
+                <a:latin typeface="Arial" panose="020B0604020202020204" pitchFamily="34" charset="0"/>
+                <a:cs typeface="Arial" panose="020B0604020202020204" pitchFamily="34" charset="0"/>
+              </a:rPr>
+              <a:t>indice</a:t>
+            </a:r>
+            <a:r>
+              <a:rPr lang="en-US" sz="1200" dirty="0">
+                <a:latin typeface="Arial" panose="020B0604020202020204" pitchFamily="34" charset="0"/>
+                <a:cs typeface="Arial" panose="020B0604020202020204" pitchFamily="34" charset="0"/>
+              </a:rPr>
+              <a:t> se </a:t>
+            </a:r>
+            <a:r>
+              <a:rPr lang="en-US" sz="1200" dirty="0" err="1">
+                <a:latin typeface="Arial" panose="020B0604020202020204" pitchFamily="34" charset="0"/>
+                <a:cs typeface="Arial" panose="020B0604020202020204" pitchFamily="34" charset="0"/>
+              </a:rPr>
+              <a:t>consigue</a:t>
+            </a:r>
+            <a:r>
+              <a:rPr lang="en-US" sz="1200" dirty="0">
+                <a:latin typeface="Arial" panose="020B0604020202020204" pitchFamily="34" charset="0"/>
+                <a:cs typeface="Arial" panose="020B0604020202020204" pitchFamily="34" charset="0"/>
+              </a:rPr>
+              <a:t> </a:t>
+            </a:r>
+            <a:r>
+              <a:rPr lang="en-US" sz="1200" dirty="0" err="1">
+                <a:latin typeface="Arial" panose="020B0604020202020204" pitchFamily="34" charset="0"/>
+                <a:cs typeface="Arial" panose="020B0604020202020204" pitchFamily="34" charset="0"/>
+              </a:rPr>
+              <a:t>tambien</a:t>
+            </a:r>
+            <a:r>
+              <a:rPr lang="en-US" sz="1200" dirty="0">
+                <a:latin typeface="Arial" panose="020B0604020202020204" pitchFamily="34" charset="0"/>
+                <a:cs typeface="Arial" panose="020B0604020202020204" pitchFamily="34" charset="0"/>
+              </a:rPr>
+              <a:t> </a:t>
+            </a:r>
+            <a:r>
+              <a:rPr lang="en-US" sz="1200" dirty="0" err="1">
+                <a:latin typeface="Arial" panose="020B0604020202020204" pitchFamily="34" charset="0"/>
+                <a:cs typeface="Arial" panose="020B0604020202020204" pitchFamily="34" charset="0"/>
+              </a:rPr>
+              <a:t>cuando</a:t>
+            </a:r>
+            <a:r>
+              <a:rPr lang="en-US" sz="1200" dirty="0">
+                <a:latin typeface="Arial" panose="020B0604020202020204" pitchFamily="34" charset="0"/>
+                <a:cs typeface="Arial" panose="020B0604020202020204" pitchFamily="34" charset="0"/>
+              </a:rPr>
+              <a:t> </a:t>
+            </a:r>
+            <a:r>
+              <a:rPr lang="en-US" sz="1200" dirty="0" err="1">
+                <a:latin typeface="Arial" panose="020B0604020202020204" pitchFamily="34" charset="0"/>
+                <a:cs typeface="Arial" panose="020B0604020202020204" pitchFamily="34" charset="0"/>
+              </a:rPr>
+              <a:t>el</a:t>
+            </a:r>
+            <a:r>
+              <a:rPr lang="en-US" sz="1200" dirty="0">
+                <a:latin typeface="Arial" panose="020B0604020202020204" pitchFamily="34" charset="0"/>
+                <a:cs typeface="Arial" panose="020B0604020202020204" pitchFamily="34" charset="0"/>
+              </a:rPr>
+              <a:t> grid resolution es de 20 se </a:t>
+            </a:r>
+            <a:r>
+              <a:rPr lang="en-US" sz="1200" dirty="0" err="1">
+                <a:latin typeface="Arial" panose="020B0604020202020204" pitchFamily="34" charset="0"/>
+                <a:cs typeface="Arial" panose="020B0604020202020204" pitchFamily="34" charset="0"/>
+              </a:rPr>
+              <a:t>establece</a:t>
+            </a:r>
+            <a:r>
+              <a:rPr lang="en-US" sz="1200" dirty="0">
+                <a:latin typeface="Arial" panose="020B0604020202020204" pitchFamily="34" charset="0"/>
+                <a:cs typeface="Arial" panose="020B0604020202020204" pitchFamily="34" charset="0"/>
+              </a:rPr>
+              <a:t> </a:t>
+            </a:r>
+            <a:r>
+              <a:rPr lang="en-US" sz="1200" dirty="0" err="1">
+                <a:latin typeface="Arial" panose="020B0604020202020204" pitchFamily="34" charset="0"/>
+                <a:cs typeface="Arial" panose="020B0604020202020204" pitchFamily="34" charset="0"/>
+              </a:rPr>
+              <a:t>que</a:t>
+            </a:r>
+            <a:r>
+              <a:rPr lang="en-US" sz="1200" dirty="0">
+                <a:latin typeface="Arial" panose="020B0604020202020204" pitchFamily="34" charset="0"/>
+                <a:cs typeface="Arial" panose="020B0604020202020204" pitchFamily="34" charset="0"/>
+              </a:rPr>
+              <a:t> </a:t>
+            </a:r>
+            <a:r>
+              <a:rPr lang="en-US" sz="1200" dirty="0" err="1">
+                <a:latin typeface="Arial" panose="020B0604020202020204" pitchFamily="34" charset="0"/>
+                <a:cs typeface="Arial" panose="020B0604020202020204" pitchFamily="34" charset="0"/>
+              </a:rPr>
+              <a:t>el</a:t>
+            </a:r>
+            <a:r>
+              <a:rPr lang="en-US" sz="1200" dirty="0">
+                <a:latin typeface="Arial" panose="020B0604020202020204" pitchFamily="34" charset="0"/>
+                <a:cs typeface="Arial" panose="020B0604020202020204" pitchFamily="34" charset="0"/>
+              </a:rPr>
+              <a:t> max grid scaling se </a:t>
+            </a:r>
+            <a:r>
+              <a:rPr lang="en-US" sz="1200" dirty="0" err="1">
+                <a:latin typeface="Arial" panose="020B0604020202020204" pitchFamily="34" charset="0"/>
+                <a:cs typeface="Arial" panose="020B0604020202020204" pitchFamily="34" charset="0"/>
+              </a:rPr>
+              <a:t>calcula</a:t>
+            </a:r>
+            <a:r>
+              <a:rPr lang="en-US" sz="1200" dirty="0">
+                <a:latin typeface="Arial" panose="020B0604020202020204" pitchFamily="34" charset="0"/>
+                <a:cs typeface="Arial" panose="020B0604020202020204" pitchFamily="34" charset="0"/>
+              </a:rPr>
+              <a:t> a </a:t>
+            </a:r>
+            <a:r>
+              <a:rPr lang="en-US" sz="1200" dirty="0" err="1">
+                <a:latin typeface="Arial" panose="020B0604020202020204" pitchFamily="34" charset="0"/>
+                <a:cs typeface="Arial" panose="020B0604020202020204" pitchFamily="34" charset="0"/>
+              </a:rPr>
+              <a:t>partir</a:t>
+            </a:r>
+            <a:r>
+              <a:rPr lang="en-US" sz="1200" dirty="0">
+                <a:latin typeface="Arial" panose="020B0604020202020204" pitchFamily="34" charset="0"/>
+                <a:cs typeface="Arial" panose="020B0604020202020204" pitchFamily="34" charset="0"/>
+              </a:rPr>
+              <a:t> de 20. Por </a:t>
+            </a:r>
+            <a:r>
+              <a:rPr lang="en-US" sz="1200" dirty="0" err="1">
+                <a:latin typeface="Arial" panose="020B0604020202020204" pitchFamily="34" charset="0"/>
+                <a:cs typeface="Arial" panose="020B0604020202020204" pitchFamily="34" charset="0"/>
+              </a:rPr>
+              <a:t>otro</a:t>
+            </a:r>
+            <a:r>
+              <a:rPr lang="en-US" sz="1200" dirty="0">
+                <a:latin typeface="Arial" panose="020B0604020202020204" pitchFamily="34" charset="0"/>
+                <a:cs typeface="Arial" panose="020B0604020202020204" pitchFamily="34" charset="0"/>
+              </a:rPr>
+              <a:t> </a:t>
+            </a:r>
+            <a:r>
+              <a:rPr lang="en-US" sz="1200" dirty="0" err="1">
+                <a:latin typeface="Arial" panose="020B0604020202020204" pitchFamily="34" charset="0"/>
+                <a:cs typeface="Arial" panose="020B0604020202020204" pitchFamily="34" charset="0"/>
+              </a:rPr>
+              <a:t>lado</a:t>
+            </a:r>
+            <a:r>
+              <a:rPr lang="en-US" sz="1200" dirty="0">
+                <a:latin typeface="Arial" panose="020B0604020202020204" pitchFamily="34" charset="0"/>
+                <a:cs typeface="Arial" panose="020B0604020202020204" pitchFamily="34" charset="0"/>
+              </a:rPr>
+              <a:t> </a:t>
+            </a:r>
+            <a:r>
+              <a:rPr lang="en-US" sz="1200" dirty="0" err="1">
+                <a:latin typeface="Arial" panose="020B0604020202020204" pitchFamily="34" charset="0"/>
+                <a:cs typeface="Arial" panose="020B0604020202020204" pitchFamily="34" charset="0"/>
+              </a:rPr>
+              <a:t>en</a:t>
+            </a:r>
+            <a:r>
+              <a:rPr lang="en-US" sz="1200" dirty="0">
+                <a:latin typeface="Arial" panose="020B0604020202020204" pitchFamily="34" charset="0"/>
+                <a:cs typeface="Arial" panose="020B0604020202020204" pitchFamily="34" charset="0"/>
+              </a:rPr>
+              <a:t> </a:t>
+            </a:r>
+            <a:r>
+              <a:rPr lang="en-US" sz="1200" dirty="0" err="1">
+                <a:latin typeface="Arial" panose="020B0604020202020204" pitchFamily="34" charset="0"/>
+                <a:cs typeface="Arial" panose="020B0604020202020204" pitchFamily="34" charset="0"/>
+              </a:rPr>
+              <a:t>el</a:t>
+            </a:r>
+            <a:r>
+              <a:rPr lang="en-US" sz="1200" dirty="0">
+                <a:latin typeface="Arial" panose="020B0604020202020204" pitchFamily="34" charset="0"/>
+                <a:cs typeface="Arial" panose="020B0604020202020204" pitchFamily="34" charset="0"/>
+              </a:rPr>
+              <a:t> max grid scaling se </a:t>
+            </a:r>
+            <a:r>
+              <a:rPr lang="en-US" sz="1200" dirty="0" err="1">
+                <a:latin typeface="Arial" panose="020B0604020202020204" pitchFamily="34" charset="0"/>
+                <a:cs typeface="Arial" panose="020B0604020202020204" pitchFamily="34" charset="0"/>
+              </a:rPr>
+              <a:t>empieza</a:t>
+            </a:r>
+            <a:r>
+              <a:rPr lang="en-US" sz="1200" dirty="0">
+                <a:latin typeface="Arial" panose="020B0604020202020204" pitchFamily="34" charset="0"/>
+                <a:cs typeface="Arial" panose="020B0604020202020204" pitchFamily="34" charset="0"/>
+              </a:rPr>
+              <a:t> a </a:t>
+            </a:r>
+            <a:r>
+              <a:rPr lang="en-US" sz="1200" dirty="0" err="1">
+                <a:latin typeface="Arial" panose="020B0604020202020204" pitchFamily="34" charset="0"/>
+                <a:cs typeface="Arial" panose="020B0604020202020204" pitchFamily="34" charset="0"/>
+              </a:rPr>
+              <a:t>hacer</a:t>
+            </a:r>
+            <a:r>
+              <a:rPr lang="en-US" sz="1200" dirty="0">
+                <a:latin typeface="Arial" panose="020B0604020202020204" pitchFamily="34" charset="0"/>
+                <a:cs typeface="Arial" panose="020B0604020202020204" pitchFamily="34" charset="0"/>
+              </a:rPr>
+              <a:t> </a:t>
+            </a:r>
+            <a:r>
+              <a:rPr lang="en-US" sz="1200" dirty="0" err="1">
+                <a:latin typeface="Arial" panose="020B0604020202020204" pitchFamily="34" charset="0"/>
+                <a:cs typeface="Arial" panose="020B0604020202020204" pitchFamily="34" charset="0"/>
+              </a:rPr>
+              <a:t>constante</a:t>
+            </a:r>
+            <a:r>
+              <a:rPr lang="en-US" sz="1200" dirty="0">
+                <a:latin typeface="Arial" panose="020B0604020202020204" pitchFamily="34" charset="0"/>
+                <a:cs typeface="Arial" panose="020B0604020202020204" pitchFamily="34" charset="0"/>
+              </a:rPr>
+              <a:t> a </a:t>
+            </a:r>
+            <a:r>
+              <a:rPr lang="en-US" sz="1200" dirty="0" err="1">
+                <a:latin typeface="Arial" panose="020B0604020202020204" pitchFamily="34" charset="0"/>
+                <a:cs typeface="Arial" panose="020B0604020202020204" pitchFamily="34" charset="0"/>
+              </a:rPr>
+              <a:t>partit</a:t>
+            </a:r>
+            <a:r>
+              <a:rPr lang="en-US" sz="1200">
+                <a:latin typeface="Arial" panose="020B0604020202020204" pitchFamily="34" charset="0"/>
+                <a:cs typeface="Arial" panose="020B0604020202020204" pitchFamily="34" charset="0"/>
+              </a:rPr>
+              <a:t> de un max grid de 1.5.</a:t>
+            </a:r>
             <a:endParaRPr lang="en-US" sz="1200" dirty="0">
               <a:latin typeface="Arial" panose="020B0604020202020204" pitchFamily="34" charset="0"/>
               <a:cs typeface="Arial" panose="020B0604020202020204" pitchFamily="34" charset="0"/>
@@ -5278,6 +5750,66 @@
           </a:p>
         </p:txBody>
       </p:sp>
+      <p:pic>
+        <p:nvPicPr>
+          <p:cNvPr id="7" name="Imagen 6" descr="Gráfico, Gráfico de líneas&#10;&#10;El contenido generado por IA puede ser incorrecto.">
+            <a:extLst>
+              <a:ext uri="{FF2B5EF4-FFF2-40B4-BE49-F238E27FC236}">
+                <a16:creationId xmlns:a16="http://schemas.microsoft.com/office/drawing/2014/main" id="{8BDC07C1-0522-B124-F628-B2B2A1425336}"/>
+              </a:ext>
+            </a:extLst>
+          </p:cNvPr>
+          <p:cNvPicPr>
+            <a:picLocks noChangeAspect="1"/>
+          </p:cNvPicPr>
+          <p:nvPr/>
+        </p:nvPicPr>
+        <p:blipFill>
+          <a:blip r:embed="rId5"/>
+          <a:stretch>
+            <a:fillRect/>
+          </a:stretch>
+        </p:blipFill>
+        <p:spPr>
+          <a:xfrm>
+            <a:off x="570213" y="1688851"/>
+            <a:ext cx="5639214" cy="3108228"/>
+          </a:xfrm>
+          <a:prstGeom prst="rect">
+            <a:avLst/>
+          </a:prstGeom>
+        </p:spPr>
+      </p:pic>
+      <p:pic>
+        <p:nvPicPr>
+          <p:cNvPr id="11" name="Imagen 10" descr="Gráfico, Gráfico de líneas&#10;&#10;El contenido generado por IA puede ser incorrecto.">
+            <a:extLst>
+              <a:ext uri="{FF2B5EF4-FFF2-40B4-BE49-F238E27FC236}">
+                <a16:creationId xmlns:a16="http://schemas.microsoft.com/office/drawing/2014/main" id="{BEA49D36-F261-4B37-A3B5-D8DED63956A7}"/>
+              </a:ext>
+            </a:extLst>
+          </p:cNvPr>
+          <p:cNvPicPr>
+            <a:picLocks noChangeAspect="1"/>
+          </p:cNvPicPr>
+          <p:nvPr/>
+        </p:nvPicPr>
+        <p:blipFill>
+          <a:blip r:embed="rId6"/>
+          <a:stretch>
+            <a:fillRect/>
+          </a:stretch>
+        </p:blipFill>
+        <p:spPr>
+          <a:xfrm>
+            <a:off x="6322853" y="1476780"/>
+            <a:ext cx="5486560" cy="3024088"/>
+          </a:xfrm>
+          <a:prstGeom prst="rect">
+            <a:avLst/>
+          </a:prstGeom>
+        </p:spPr>
+      </p:pic>
     </p:spTree>
     <p:extLst>
       <p:ext uri="{BB962C8B-B14F-4D97-AF65-F5344CB8AC3E}">
@@ -5708,8 +6240,8 @@
           <a:chExt cx="0" cy="0"/>
         </a:xfrm>
       </p:grpSpPr>
-      <mc:AlternateContent xmlns:mc="http://schemas.openxmlformats.org/markup-compatibility/2006">
-        <mc:Choice xmlns:a14="http://schemas.microsoft.com/office/drawing/2010/main" Requires="a14">
+      <mc:AlternateContent xmlns:mc="http://schemas.openxmlformats.org/markup-compatibility/2006" xmlns:a14="http://schemas.microsoft.com/office/drawing/2010/main">
+        <mc:Choice Requires="a14">
           <p:sp>
             <p:nvSpPr>
               <p:cNvPr id="16" name="object 16">
@@ -6036,7 +6568,7 @@
             </p:txBody>
           </p:sp>
         </mc:Choice>
-        <mc:Fallback>
+        <mc:Fallback xmlns="">
           <p:sp>
             <p:nvSpPr>
               <p:cNvPr id="16" name="object 16">

</xml_diff>